<commit_message>
switching background to #FFFFFF
</commit_message>
<xml_diff>
--- a/nginx-2019/img/api-external-internal.pptx
+++ b/nginx-2019/img/api-external-internal.pptx
@@ -259,7 +259,7 @@
           <a:p>
             <a:fld id="{D4ECE601-2135-CC44-841A-C31560BEC2A6}" type="datetimeFigureOut">
               <a:rPr lang="en-US" smtClean="0"/>
-              <a:t>9/4/19</a:t>
+              <a:t>9/5/19</a:t>
             </a:fld>
             <a:endParaRPr lang="en-US"/>
           </a:p>
@@ -457,7 +457,7 @@
           <a:p>
             <a:fld id="{D4ECE601-2135-CC44-841A-C31560BEC2A6}" type="datetimeFigureOut">
               <a:rPr lang="en-US" smtClean="0"/>
-              <a:t>9/4/19</a:t>
+              <a:t>9/5/19</a:t>
             </a:fld>
             <a:endParaRPr lang="en-US"/>
           </a:p>
@@ -665,7 +665,7 @@
           <a:p>
             <a:fld id="{D4ECE601-2135-CC44-841A-C31560BEC2A6}" type="datetimeFigureOut">
               <a:rPr lang="en-US" smtClean="0"/>
-              <a:t>9/4/19</a:t>
+              <a:t>9/5/19</a:t>
             </a:fld>
             <a:endParaRPr lang="en-US"/>
           </a:p>
@@ -863,7 +863,7 @@
           <a:p>
             <a:fld id="{D4ECE601-2135-CC44-841A-C31560BEC2A6}" type="datetimeFigureOut">
               <a:rPr lang="en-US" smtClean="0"/>
-              <a:t>9/4/19</a:t>
+              <a:t>9/5/19</a:t>
             </a:fld>
             <a:endParaRPr lang="en-US"/>
           </a:p>
@@ -1138,7 +1138,7 @@
           <a:p>
             <a:fld id="{D4ECE601-2135-CC44-841A-C31560BEC2A6}" type="datetimeFigureOut">
               <a:rPr lang="en-US" smtClean="0"/>
-              <a:t>9/4/19</a:t>
+              <a:t>9/5/19</a:t>
             </a:fld>
             <a:endParaRPr lang="en-US"/>
           </a:p>
@@ -1403,7 +1403,7 @@
           <a:p>
             <a:fld id="{D4ECE601-2135-CC44-841A-C31560BEC2A6}" type="datetimeFigureOut">
               <a:rPr lang="en-US" smtClean="0"/>
-              <a:t>9/4/19</a:t>
+              <a:t>9/5/19</a:t>
             </a:fld>
             <a:endParaRPr lang="en-US"/>
           </a:p>
@@ -1815,7 +1815,7 @@
           <a:p>
             <a:fld id="{D4ECE601-2135-CC44-841A-C31560BEC2A6}" type="datetimeFigureOut">
               <a:rPr lang="en-US" smtClean="0"/>
-              <a:t>9/4/19</a:t>
+              <a:t>9/5/19</a:t>
             </a:fld>
             <a:endParaRPr lang="en-US"/>
           </a:p>
@@ -1956,7 +1956,7 @@
           <a:p>
             <a:fld id="{D4ECE601-2135-CC44-841A-C31560BEC2A6}" type="datetimeFigureOut">
               <a:rPr lang="en-US" smtClean="0"/>
-              <a:t>9/4/19</a:t>
+              <a:t>9/5/19</a:t>
             </a:fld>
             <a:endParaRPr lang="en-US"/>
           </a:p>
@@ -2069,7 +2069,7 @@
           <a:p>
             <a:fld id="{D4ECE601-2135-CC44-841A-C31560BEC2A6}" type="datetimeFigureOut">
               <a:rPr lang="en-US" smtClean="0"/>
-              <a:t>9/4/19</a:t>
+              <a:t>9/5/19</a:t>
             </a:fld>
             <a:endParaRPr lang="en-US"/>
           </a:p>
@@ -2380,7 +2380,7 @@
           <a:p>
             <a:fld id="{D4ECE601-2135-CC44-841A-C31560BEC2A6}" type="datetimeFigureOut">
               <a:rPr lang="en-US" smtClean="0"/>
-              <a:t>9/4/19</a:t>
+              <a:t>9/5/19</a:t>
             </a:fld>
             <a:endParaRPr lang="en-US"/>
           </a:p>
@@ -2668,7 +2668,7 @@
           <a:p>
             <a:fld id="{D4ECE601-2135-CC44-841A-C31560BEC2A6}" type="datetimeFigureOut">
               <a:rPr lang="en-US" smtClean="0"/>
-              <a:t>9/4/19</a:t>
+              <a:t>9/5/19</a:t>
             </a:fld>
             <a:endParaRPr lang="en-US"/>
           </a:p>
@@ -2909,7 +2909,7 @@
           <a:p>
             <a:fld id="{D4ECE601-2135-CC44-841A-C31560BEC2A6}" type="datetimeFigureOut">
               <a:rPr lang="en-US" smtClean="0"/>
-              <a:t>9/4/19</a:t>
+              <a:t>9/5/19</a:t>
             </a:fld>
             <a:endParaRPr lang="en-US"/>
           </a:p>
@@ -3312,6 +3312,14 @@
 <file path=ppt/slides/slide1.xml><?xml version="1.0" encoding="utf-8"?>
 <p:sld xmlns:a="http://schemas.openxmlformats.org/drawingml/2006/main" xmlns:r="http://schemas.openxmlformats.org/officeDocument/2006/relationships" xmlns:p="http://schemas.openxmlformats.org/presentationml/2006/main">
   <p:cSld>
+    <p:bg>
+      <p:bgPr>
+        <a:solidFill>
+          <a:schemeClr val="bg1"/>
+        </a:solidFill>
+        <a:effectLst/>
+      </p:bgPr>
+    </p:bg>
     <p:spTree>
       <p:nvGrpSpPr>
         <p:cNvPr id="1" name=""/>

</xml_diff>

<commit_message>
adding left-hand text box
</commit_message>
<xml_diff>
--- a/nginx-2019/img/api-external-internal.pptx
+++ b/nginx-2019/img/api-external-internal.pptx
@@ -4830,6 +4830,158 @@
                 <a:schemeClr val="tx1"/>
               </a:solidFill>
             </a:endParaRPr>
+          </a:p>
+        </p:txBody>
+      </p:sp>
+      <p:sp>
+        <p:nvSpPr>
+          <p:cNvPr id="3" name="Rectangle 2">
+            <a:extLst>
+              <a:ext uri="{FF2B5EF4-FFF2-40B4-BE49-F238E27FC236}">
+                <a16:creationId xmlns:a16="http://schemas.microsoft.com/office/drawing/2014/main" id="{FD1DC42E-8A6D-5047-AA55-54D3C66DE344}"/>
+              </a:ext>
+            </a:extLst>
+          </p:cNvPr>
+          <p:cNvSpPr/>
+          <p:nvPr/>
+        </p:nvSpPr>
+        <p:spPr>
+          <a:xfrm>
+            <a:off x="1386840" y="774868"/>
+            <a:ext cx="716280" cy="5382370"/>
+          </a:xfrm>
+          <a:prstGeom prst="rect">
+            <a:avLst/>
+          </a:prstGeom>
+          <a:gradFill flip="none" rotWithShape="1">
+            <a:gsLst>
+              <a:gs pos="8016">
+                <a:schemeClr val="accent5">
+                  <a:lumMod val="75000"/>
+                </a:schemeClr>
+              </a:gs>
+              <a:gs pos="0">
+                <a:schemeClr val="accent1">
+                  <a:lumMod val="67000"/>
+                </a:schemeClr>
+              </a:gs>
+              <a:gs pos="37000">
+                <a:schemeClr val="accent1">
+                  <a:lumMod val="97000"/>
+                  <a:lumOff val="3000"/>
+                </a:schemeClr>
+              </a:gs>
+              <a:gs pos="100000">
+                <a:schemeClr val="accent1">
+                  <a:lumMod val="60000"/>
+                  <a:lumOff val="40000"/>
+                </a:schemeClr>
+              </a:gs>
+            </a:gsLst>
+            <a:lin ang="16200000" scaled="1"/>
+            <a:tileRect/>
+          </a:gradFill>
+          <a:ln w="50800"/>
+        </p:spPr>
+        <p:style>
+          <a:lnRef idx="2">
+            <a:schemeClr val="accent1">
+              <a:shade val="50000"/>
+            </a:schemeClr>
+          </a:lnRef>
+          <a:fillRef idx="1">
+            <a:schemeClr val="accent1"/>
+          </a:fillRef>
+          <a:effectRef idx="0">
+            <a:schemeClr val="accent1"/>
+          </a:effectRef>
+          <a:fontRef idx="minor">
+            <a:schemeClr val="lt1"/>
+          </a:fontRef>
+        </p:style>
+        <p:txBody>
+          <a:bodyPr rtlCol="0" anchor="ctr"/>
+          <a:lstStyle/>
+          <a:p>
+            <a:pPr algn="ctr"/>
+            <a:endParaRPr lang="en-US"/>
+          </a:p>
+        </p:txBody>
+      </p:sp>
+      <p:sp>
+        <p:nvSpPr>
+          <p:cNvPr id="4" name="TextBox 3">
+            <a:extLst>
+              <a:ext uri="{FF2B5EF4-FFF2-40B4-BE49-F238E27FC236}">
+                <a16:creationId xmlns:a16="http://schemas.microsoft.com/office/drawing/2014/main" id="{775C073A-321A-404F-84F3-28CDC8843AAB}"/>
+              </a:ext>
+            </a:extLst>
+          </p:cNvPr>
+          <p:cNvSpPr txBox="1"/>
+          <p:nvPr/>
+        </p:nvSpPr>
+        <p:spPr>
+          <a:xfrm rot="16200000">
+            <a:off x="1035485" y="1498794"/>
+            <a:ext cx="1426994" cy="338554"/>
+          </a:xfrm>
+          <a:prstGeom prst="rect">
+            <a:avLst/>
+          </a:prstGeom>
+          <a:noFill/>
+        </p:spPr>
+        <p:txBody>
+          <a:bodyPr wrap="none" rtlCol="0">
+            <a:spAutoFit/>
+          </a:bodyPr>
+          <a:lstStyle/>
+          <a:p>
+            <a:r>
+              <a:rPr lang="en-US" sz="1600" dirty="0">
+                <a:latin typeface="Helvetica" pitchFamily="2" charset="0"/>
+              </a:rPr>
+              <a:t>API Economy</a:t>
+            </a:r>
+          </a:p>
+        </p:txBody>
+      </p:sp>
+      <p:sp>
+        <p:nvSpPr>
+          <p:cNvPr id="5" name="TextBox 4">
+            <a:extLst>
+              <a:ext uri="{FF2B5EF4-FFF2-40B4-BE49-F238E27FC236}">
+                <a16:creationId xmlns:a16="http://schemas.microsoft.com/office/drawing/2014/main" id="{E5C41ED4-0021-304A-9071-9D7C6EDE2B61}"/>
+              </a:ext>
+            </a:extLst>
+          </p:cNvPr>
+          <p:cNvSpPr txBox="1"/>
+          <p:nvPr/>
+        </p:nvSpPr>
+        <p:spPr>
+          <a:xfrm rot="16200000">
+            <a:off x="659516" y="4739805"/>
+            <a:ext cx="2178930" cy="338554"/>
+          </a:xfrm>
+          <a:prstGeom prst="rect">
+            <a:avLst/>
+          </a:prstGeom>
+          <a:noFill/>
+        </p:spPr>
+        <p:txBody>
+          <a:bodyPr wrap="none" rtlCol="0">
+            <a:spAutoFit/>
+          </a:bodyPr>
+          <a:lstStyle/>
+          <a:p>
+            <a:r>
+              <a:rPr lang="en-US" sz="1600" dirty="0">
+                <a:solidFill>
+                  <a:schemeClr val="bg1"/>
+                </a:solidFill>
+                <a:latin typeface="Helvetica" pitchFamily="2" charset="0"/>
+              </a:rPr>
+              <a:t>Digital Transformation</a:t>
+            </a:r>
           </a:p>
         </p:txBody>
       </p:sp>

</xml_diff>